<commit_message>
ch10 A1의 A2 수정 / ch09의 A2의 A01 생성 / 과제 작성
</commit_message>
<xml_diff>
--- a/기본프로그래밍_java/과제/10강/35_임현덕_20220407.pptx
+++ b/기본프로그래밍_java/과제/10강/35_임현덕_20220407.pptx
@@ -5,17 +5,18 @@
     <p:sldMasterId id="2147483648" r:id="rId1"/>
   </p:sldMasterIdLst>
   <p:notesMasterIdLst>
-    <p:notesMasterId r:id="rId10"/>
+    <p:notesMasterId r:id="rId11"/>
   </p:notesMasterIdLst>
   <p:sldIdLst>
     <p:sldId id="257" r:id="rId2"/>
     <p:sldId id="261" r:id="rId3"/>
     <p:sldId id="258" r:id="rId4"/>
     <p:sldId id="262" r:id="rId5"/>
-    <p:sldId id="259" r:id="rId6"/>
-    <p:sldId id="263" r:id="rId7"/>
-    <p:sldId id="260" r:id="rId8"/>
-    <p:sldId id="264" r:id="rId9"/>
+    <p:sldId id="265" r:id="rId6"/>
+    <p:sldId id="259" r:id="rId7"/>
+    <p:sldId id="263" r:id="rId8"/>
+    <p:sldId id="260" r:id="rId9"/>
+    <p:sldId id="264" r:id="rId10"/>
   </p:sldIdLst>
   <p:sldSz cx="12192000" cy="6858000"/>
   <p:notesSz cx="6858000" cy="9144000"/>
@@ -114,6 +115,11 @@
       </a:defRPr>
     </a:lvl9pPr>
   </p:defaultTextStyle>
+  <p:extLst>
+    <p:ext uri="{EFAFB233-063F-42B5-8137-9DF3F51BA10A}">
+      <p15:sldGuideLst xmlns:p15="http://schemas.microsoft.com/office/powerpoint/2012/main"/>
+    </p:ext>
+  </p:extLst>
 </p:presentation>
 </file>
 
@@ -199,7 +205,7 @@
           <a:p>
             <a:fld id="{57860B09-A9C1-450F-A197-A25A2CA8E796}" type="datetimeFigureOut">
               <a:rPr lang="ko-KR" altLang="en-US" smtClean="0"/>
-              <a:t>2022-04-07</a:t>
+              <a:t>2022-04-08</a:t>
             </a:fld>
             <a:endParaRPr lang="ko-KR" altLang="en-US"/>
           </a:p>
@@ -1034,7 +1040,7 @@
           <a:p>
             <a:fld id="{58092E2F-2F15-4AB9-AB77-E853F690267F}" type="datetimeFigureOut">
               <a:rPr lang="ko-KR" altLang="en-US" smtClean="0"/>
-              <a:t>2022-04-07</a:t>
+              <a:t>2022-04-08</a:t>
             </a:fld>
             <a:endParaRPr lang="ko-KR" altLang="en-US"/>
           </a:p>
@@ -1204,7 +1210,7 @@
           <a:p>
             <a:fld id="{58092E2F-2F15-4AB9-AB77-E853F690267F}" type="datetimeFigureOut">
               <a:rPr lang="ko-KR" altLang="en-US" smtClean="0"/>
-              <a:t>2022-04-07</a:t>
+              <a:t>2022-04-08</a:t>
             </a:fld>
             <a:endParaRPr lang="ko-KR" altLang="en-US"/>
           </a:p>
@@ -1384,7 +1390,7 @@
           <a:p>
             <a:fld id="{58092E2F-2F15-4AB9-AB77-E853F690267F}" type="datetimeFigureOut">
               <a:rPr lang="ko-KR" altLang="en-US" smtClean="0"/>
-              <a:t>2022-04-07</a:t>
+              <a:t>2022-04-08</a:t>
             </a:fld>
             <a:endParaRPr lang="ko-KR" altLang="en-US"/>
           </a:p>
@@ -2364,7 +2370,7 @@
           <a:p>
             <a:fld id="{58092E2F-2F15-4AB9-AB77-E853F690267F}" type="datetimeFigureOut">
               <a:rPr lang="ko-KR" altLang="en-US" smtClean="0"/>
-              <a:t>2022-04-07</a:t>
+              <a:t>2022-04-08</a:t>
             </a:fld>
             <a:endParaRPr lang="ko-KR" altLang="en-US"/>
           </a:p>
@@ -2610,7 +2616,7 @@
           <a:p>
             <a:fld id="{58092E2F-2F15-4AB9-AB77-E853F690267F}" type="datetimeFigureOut">
               <a:rPr lang="ko-KR" altLang="en-US" smtClean="0"/>
-              <a:t>2022-04-07</a:t>
+              <a:t>2022-04-08</a:t>
             </a:fld>
             <a:endParaRPr lang="ko-KR" altLang="en-US"/>
           </a:p>
@@ -2842,7 +2848,7 @@
           <a:p>
             <a:fld id="{58092E2F-2F15-4AB9-AB77-E853F690267F}" type="datetimeFigureOut">
               <a:rPr lang="ko-KR" altLang="en-US" smtClean="0"/>
-              <a:t>2022-04-07</a:t>
+              <a:t>2022-04-08</a:t>
             </a:fld>
             <a:endParaRPr lang="ko-KR" altLang="en-US"/>
           </a:p>
@@ -3209,7 +3215,7 @@
           <a:p>
             <a:fld id="{58092E2F-2F15-4AB9-AB77-E853F690267F}" type="datetimeFigureOut">
               <a:rPr lang="ko-KR" altLang="en-US" smtClean="0"/>
-              <a:t>2022-04-07</a:t>
+              <a:t>2022-04-08</a:t>
             </a:fld>
             <a:endParaRPr lang="ko-KR" altLang="en-US"/>
           </a:p>
@@ -3327,7 +3333,7 @@
           <a:p>
             <a:fld id="{58092E2F-2F15-4AB9-AB77-E853F690267F}" type="datetimeFigureOut">
               <a:rPr lang="ko-KR" altLang="en-US" smtClean="0"/>
-              <a:t>2022-04-07</a:t>
+              <a:t>2022-04-08</a:t>
             </a:fld>
             <a:endParaRPr lang="ko-KR" altLang="en-US"/>
           </a:p>
@@ -3422,7 +3428,7 @@
           <a:p>
             <a:fld id="{58092E2F-2F15-4AB9-AB77-E853F690267F}" type="datetimeFigureOut">
               <a:rPr lang="ko-KR" altLang="en-US" smtClean="0"/>
-              <a:t>2022-04-07</a:t>
+              <a:t>2022-04-08</a:t>
             </a:fld>
             <a:endParaRPr lang="ko-KR" altLang="en-US"/>
           </a:p>
@@ -3699,7 +3705,7 @@
           <a:p>
             <a:fld id="{58092E2F-2F15-4AB9-AB77-E853F690267F}" type="datetimeFigureOut">
               <a:rPr lang="ko-KR" altLang="en-US" smtClean="0"/>
-              <a:t>2022-04-07</a:t>
+              <a:t>2022-04-08</a:t>
             </a:fld>
             <a:endParaRPr lang="ko-KR" altLang="en-US"/>
           </a:p>
@@ -3952,7 +3958,7 @@
           <a:p>
             <a:fld id="{58092E2F-2F15-4AB9-AB77-E853F690267F}" type="datetimeFigureOut">
               <a:rPr lang="ko-KR" altLang="en-US" smtClean="0"/>
-              <a:t>2022-04-07</a:t>
+              <a:t>2022-04-08</a:t>
             </a:fld>
             <a:endParaRPr lang="ko-KR" altLang="en-US"/>
           </a:p>
@@ -4165,7 +4171,7 @@
           <a:p>
             <a:fld id="{58092E2F-2F15-4AB9-AB77-E853F690267F}" type="datetimeFigureOut">
               <a:rPr lang="ko-KR" altLang="en-US" smtClean="0"/>
-              <a:t>2022-04-07</a:t>
+              <a:t>2022-04-08</a:t>
             </a:fld>
             <a:endParaRPr lang="ko-KR" altLang="en-US"/>
           </a:p>
@@ -4957,14 +4963,6 @@
                 </a:rPr>
                 <a:t>User inputs a time in second</a:t>
               </a:r>
-              <a:endParaRPr lang="en-US" altLang="ko-KR" sz="2208" dirty="0">
-                <a:solidFill>
-                  <a:srgbClr val="838787"/>
-                </a:solidFill>
-                <a:latin typeface="Verdana"/>
-                <a:ea typeface="Verdana"/>
-                <a:sym typeface="Verdana"/>
-              </a:endParaRPr>
             </a:p>
             <a:p>
               <a:pPr marL="292100" indent="-292100">
@@ -5116,18 +5114,7 @@
                   <a:ea typeface="Verdana"/>
                   <a:sym typeface="Verdana"/>
                 </a:rPr>
-                <a:t>t</a:t>
-              </a:r>
-              <a:r>
-                <a:rPr lang="en-US" altLang="ko-KR" sz="2208" dirty="0">
-                  <a:solidFill>
-                    <a:srgbClr val="838787"/>
-                  </a:solidFill>
-                  <a:latin typeface="Verdana"/>
-                  <a:ea typeface="Verdana"/>
-                  <a:sym typeface="Verdana"/>
-                </a:rPr>
-                <a:t>ime is already over(It’s 12:36:10)</a:t>
+                <a:t>time is already over(It’s 12:36:10)</a:t>
               </a:r>
             </a:p>
             <a:p>
@@ -5165,18 +5152,7 @@
                   <a:ea typeface="Verdana"/>
                   <a:sym typeface="Verdana"/>
                 </a:rPr>
-                <a:t>t</a:t>
-              </a:r>
-              <a:r>
-                <a:rPr lang="en-US" altLang="ko-KR" sz="2208" dirty="0">
-                  <a:solidFill>
-                    <a:srgbClr val="838787"/>
-                  </a:solidFill>
-                  <a:latin typeface="Verdana"/>
-                  <a:ea typeface="Verdana"/>
-                  <a:sym typeface="Verdana"/>
-                </a:rPr>
-                <a:t>ime is over(12:37:50) </a:t>
+                <a:t>time is over(12:37:50) </a:t>
               </a:r>
             </a:p>
             <a:p>
@@ -5960,18 +5936,7 @@
                   <a:ea typeface="Verdana"/>
                   <a:sym typeface="Verdana"/>
                 </a:rPr>
-                <a:t> </a:t>
-              </a:r>
-              <a:r>
-                <a:rPr lang="en-US" altLang="ko-KR" sz="2208" dirty="0">
-                  <a:solidFill>
-                    <a:srgbClr val="838787"/>
-                  </a:solidFill>
-                  <a:latin typeface="Verdana"/>
-                  <a:ea typeface="Verdana"/>
-                  <a:sym typeface="Verdana"/>
-                </a:rPr>
-                <a:t> (Maximum is less than 10m and running distance is 50m)</a:t>
+                <a:t>  (Maximum is less than 10m and running distance is 50m)</a:t>
               </a:r>
             </a:p>
             <a:p>
@@ -8963,7 +8928,7 @@
       </p:grpSpPr>
       <p:pic>
         <p:nvPicPr>
-          <p:cNvPr id="7" name="그림 6"/>
+          <p:cNvPr id="2" name="그림 1"/>
           <p:cNvPicPr>
             <a:picLocks noChangeAspect="1"/>
           </p:cNvPicPr>
@@ -8977,8 +8942,8 @@
         </p:blipFill>
         <p:spPr>
           <a:xfrm>
-            <a:off x="4451727" y="0"/>
-            <a:ext cx="5252310" cy="6858000"/>
+            <a:off x="4075611" y="0"/>
+            <a:ext cx="6958198" cy="6858000"/>
           </a:xfrm>
           <a:prstGeom prst="rect">
             <a:avLst/>
@@ -8987,7 +8952,7 @@
       </p:pic>
       <p:pic>
         <p:nvPicPr>
-          <p:cNvPr id="5" name="그림 4"/>
+          <p:cNvPr id="3" name="그림 2"/>
           <p:cNvPicPr>
             <a:picLocks noChangeAspect="1"/>
           </p:cNvPicPr>
@@ -9001,32 +8966,8 @@
         </p:blipFill>
         <p:spPr>
           <a:xfrm>
-            <a:off x="7077882" y="5149516"/>
-            <a:ext cx="4457841" cy="1179095"/>
-          </a:xfrm>
-          <a:prstGeom prst="rect">
-            <a:avLst/>
-          </a:prstGeom>
-        </p:spPr>
-      </p:pic>
-      <p:pic>
-        <p:nvPicPr>
-          <p:cNvPr id="6" name="그림 5"/>
-          <p:cNvPicPr>
-            <a:picLocks noChangeAspect="1"/>
-          </p:cNvPicPr>
-          <p:nvPr/>
-        </p:nvPicPr>
-        <p:blipFill>
-          <a:blip r:embed="rId4"/>
-          <a:stretch>
-            <a:fillRect/>
-          </a:stretch>
-        </p:blipFill>
-        <p:spPr>
-          <a:xfrm>
-            <a:off x="611949" y="0"/>
-            <a:ext cx="3813321" cy="6858000"/>
+            <a:off x="356655" y="0"/>
+            <a:ext cx="3092335" cy="6858000"/>
           </a:xfrm>
           <a:prstGeom prst="rect">
             <a:avLst/>
@@ -9047,6 +8988,60 @@
 </file>
 
 <file path=ppt/slides/slide5.xml><?xml version="1.0" encoding="utf-8"?>
+<p:sld xmlns:a="http://schemas.openxmlformats.org/drawingml/2006/main" xmlns:r="http://schemas.openxmlformats.org/officeDocument/2006/relationships" xmlns:p="http://schemas.openxmlformats.org/presentationml/2006/main">
+  <p:cSld>
+    <p:spTree>
+      <p:nvGrpSpPr>
+        <p:cNvPr id="1" name=""/>
+        <p:cNvGrpSpPr/>
+        <p:nvPr/>
+      </p:nvGrpSpPr>
+      <p:grpSpPr>
+        <a:xfrm>
+          <a:off x="0" y="0"/>
+          <a:ext cx="0" cy="0"/>
+          <a:chOff x="0" y="0"/>
+          <a:chExt cx="0" cy="0"/>
+        </a:xfrm>
+      </p:grpSpPr>
+      <p:pic>
+        <p:nvPicPr>
+          <p:cNvPr id="5" name="그림 4"/>
+          <p:cNvPicPr>
+            <a:picLocks noChangeAspect="1"/>
+          </p:cNvPicPr>
+          <p:nvPr/>
+        </p:nvPicPr>
+        <p:blipFill>
+          <a:blip r:embed="rId2"/>
+          <a:stretch>
+            <a:fillRect/>
+          </a:stretch>
+        </p:blipFill>
+        <p:spPr>
+          <a:xfrm>
+            <a:off x="3985583" y="0"/>
+            <a:ext cx="4220833" cy="6858000"/>
+          </a:xfrm>
+          <a:prstGeom prst="rect">
+            <a:avLst/>
+          </a:prstGeom>
+        </p:spPr>
+      </p:pic>
+    </p:spTree>
+    <p:extLst>
+      <p:ext uri="{BB962C8B-B14F-4D97-AF65-F5344CB8AC3E}">
+        <p14:creationId xmlns:p14="http://schemas.microsoft.com/office/powerpoint/2010/main" val="1972132019"/>
+      </p:ext>
+    </p:extLst>
+  </p:cSld>
+  <p:clrMapOvr>
+    <a:masterClrMapping/>
+  </p:clrMapOvr>
+</p:sld>
+</file>
+
+<file path=ppt/slides/slide6.xml><?xml version="1.0" encoding="utf-8"?>
 <p:sld xmlns:a="http://schemas.openxmlformats.org/drawingml/2006/main" xmlns:r="http://schemas.openxmlformats.org/officeDocument/2006/relationships" xmlns:p="http://schemas.openxmlformats.org/presentationml/2006/main">
   <p:cSld>
     <p:spTree>
@@ -9763,7 +9758,7 @@
 </p:sld>
 </file>
 
-<file path=ppt/slides/slide6.xml><?xml version="1.0" encoding="utf-8"?>
+<file path=ppt/slides/slide7.xml><?xml version="1.0" encoding="utf-8"?>
 <p:sld xmlns:a="http://schemas.openxmlformats.org/drawingml/2006/main" xmlns:r="http://schemas.openxmlformats.org/officeDocument/2006/relationships" xmlns:p="http://schemas.openxmlformats.org/presentationml/2006/main">
   <p:cSld>
     <p:spTree>
@@ -9841,7 +9836,7 @@
 </p:sld>
 </file>
 
-<file path=ppt/slides/slide7.xml><?xml version="1.0" encoding="utf-8"?>
+<file path=ppt/slides/slide8.xml><?xml version="1.0" encoding="utf-8"?>
 <p:sld xmlns:a="http://schemas.openxmlformats.org/drawingml/2006/main" xmlns:r="http://schemas.openxmlformats.org/officeDocument/2006/relationships" xmlns:p="http://schemas.openxmlformats.org/presentationml/2006/main">
   <p:cSld>
     <p:spTree>
@@ -10246,14 +10241,6 @@
                 </a:rPr>
                 <a:t>Calculate and write the mean by point/day/hour to a file</a:t>
               </a:r>
-              <a:endParaRPr lang="en-US" altLang="ko-KR" sz="2208" dirty="0">
-                <a:solidFill>
-                  <a:srgbClr val="838787"/>
-                </a:solidFill>
-                <a:latin typeface="Verdana"/>
-                <a:ea typeface="Verdana"/>
-                <a:sym typeface="Verdana"/>
-              </a:endParaRPr>
             </a:p>
             <a:p>
               <a:pPr marL="292100" indent="-292100">
@@ -10426,7 +10413,7 @@
 </p:sld>
 </file>
 
-<file path=ppt/slides/slide8.xml><?xml version="1.0" encoding="utf-8"?>
+<file path=ppt/slides/slide9.xml><?xml version="1.0" encoding="utf-8"?>
 <p:sld xmlns:a="http://schemas.openxmlformats.org/drawingml/2006/main" xmlns:r="http://schemas.openxmlformats.org/officeDocument/2006/relationships" xmlns:p="http://schemas.openxmlformats.org/presentationml/2006/main">
   <p:cSld>
     <p:spTree>

</xml_diff>